<commit_message>
removing modulo at quantizer function, changing mse per sample to nromalized mse
</commit_message>
<xml_diff>
--- a/python/results/2 inputs.pptx
+++ b/python/results/2 inputs.pptx
@@ -112,6 +112,11 @@
       </a:defRPr>
     </a:lvl9pPr>
   </p:defaultTextStyle>
+  <p:extLst>
+    <p:ext uri="{EFAFB233-063F-42B5-8137-9DF3F51BA10A}">
+      <p15:sldGuideLst xmlns:p15="http://schemas.microsoft.com/office/powerpoint/2012/main"/>
+    </p:ext>
+  </p:extLst>
 </p:presentation>
 </file>
 
@@ -246,7 +251,7 @@
           <a:p>
             <a:fld id="{75B0A7F6-D309-4151-97A0-F73207153C2A}" type="datetimeFigureOut">
               <a:rPr lang="en-US" smtClean="0"/>
-              <a:t>2016-11-22</a:t>
+              <a:t>2016-12-06</a:t>
             </a:fld>
             <a:endParaRPr lang="en-US"/>
           </a:p>
@@ -416,7 +421,7 @@
           <a:p>
             <a:fld id="{75B0A7F6-D309-4151-97A0-F73207153C2A}" type="datetimeFigureOut">
               <a:rPr lang="en-US" smtClean="0"/>
-              <a:t>2016-11-22</a:t>
+              <a:t>2016-12-06</a:t>
             </a:fld>
             <a:endParaRPr lang="en-US"/>
           </a:p>
@@ -596,7 +601,7 @@
           <a:p>
             <a:fld id="{75B0A7F6-D309-4151-97A0-F73207153C2A}" type="datetimeFigureOut">
               <a:rPr lang="en-US" smtClean="0"/>
-              <a:t>2016-11-22</a:t>
+              <a:t>2016-12-06</a:t>
             </a:fld>
             <a:endParaRPr lang="en-US"/>
           </a:p>
@@ -766,7 +771,7 @@
           <a:p>
             <a:fld id="{75B0A7F6-D309-4151-97A0-F73207153C2A}" type="datetimeFigureOut">
               <a:rPr lang="en-US" smtClean="0"/>
-              <a:t>2016-11-22</a:t>
+              <a:t>2016-12-06</a:t>
             </a:fld>
             <a:endParaRPr lang="en-US"/>
           </a:p>
@@ -1012,7 +1017,7 @@
           <a:p>
             <a:fld id="{75B0A7F6-D309-4151-97A0-F73207153C2A}" type="datetimeFigureOut">
               <a:rPr lang="en-US" smtClean="0"/>
-              <a:t>2016-11-22</a:t>
+              <a:t>2016-12-06</a:t>
             </a:fld>
             <a:endParaRPr lang="en-US"/>
           </a:p>
@@ -1244,7 +1249,7 @@
           <a:p>
             <a:fld id="{75B0A7F6-D309-4151-97A0-F73207153C2A}" type="datetimeFigureOut">
               <a:rPr lang="en-US" smtClean="0"/>
-              <a:t>2016-11-22</a:t>
+              <a:t>2016-12-06</a:t>
             </a:fld>
             <a:endParaRPr lang="en-US"/>
           </a:p>
@@ -1611,7 +1616,7 @@
           <a:p>
             <a:fld id="{75B0A7F6-D309-4151-97A0-F73207153C2A}" type="datetimeFigureOut">
               <a:rPr lang="en-US" smtClean="0"/>
-              <a:t>2016-11-22</a:t>
+              <a:t>2016-12-06</a:t>
             </a:fld>
             <a:endParaRPr lang="en-US"/>
           </a:p>
@@ -1729,7 +1734,7 @@
           <a:p>
             <a:fld id="{75B0A7F6-D309-4151-97A0-F73207153C2A}" type="datetimeFigureOut">
               <a:rPr lang="en-US" smtClean="0"/>
-              <a:t>2016-11-22</a:t>
+              <a:t>2016-12-06</a:t>
             </a:fld>
             <a:endParaRPr lang="en-US"/>
           </a:p>
@@ -1824,7 +1829,7 @@
           <a:p>
             <a:fld id="{75B0A7F6-D309-4151-97A0-F73207153C2A}" type="datetimeFigureOut">
               <a:rPr lang="en-US" smtClean="0"/>
-              <a:t>2016-11-22</a:t>
+              <a:t>2016-12-06</a:t>
             </a:fld>
             <a:endParaRPr lang="en-US"/>
           </a:p>
@@ -2101,7 +2106,7 @@
           <a:p>
             <a:fld id="{75B0A7F6-D309-4151-97A0-F73207153C2A}" type="datetimeFigureOut">
               <a:rPr lang="en-US" smtClean="0"/>
-              <a:t>2016-11-22</a:t>
+              <a:t>2016-12-06</a:t>
             </a:fld>
             <a:endParaRPr lang="en-US"/>
           </a:p>
@@ -2354,7 +2359,7 @@
           <a:p>
             <a:fld id="{75B0A7F6-D309-4151-97A0-F73207153C2A}" type="datetimeFigureOut">
               <a:rPr lang="en-US" smtClean="0"/>
-              <a:t>2016-11-22</a:t>
+              <a:t>2016-12-06</a:t>
             </a:fld>
             <a:endParaRPr lang="en-US"/>
           </a:p>
@@ -2567,7 +2572,7 @@
           <a:p>
             <a:fld id="{75B0A7F6-D309-4151-97A0-F73207153C2A}" type="datetimeFigureOut">
               <a:rPr lang="en-US" smtClean="0"/>
-              <a:t>2016-11-22</a:t>
+              <a:t>2016-12-06</a:t>
             </a:fld>
             <a:endParaRPr lang="en-US"/>
           </a:p>
@@ -3181,7 +3186,6 @@
                         <a:rPr lang="en-US" dirty="0" smtClean="0"/>
                         <a:t>for 15 quants:</a:t>
                       </a:r>
-                      <a:endParaRPr lang="en-US" dirty="0" smtClean="0"/>
                     </a:p>
                   </a:txBody>
                   <a:tcPr/>
@@ -3479,7 +3483,6 @@
                         <a:rPr lang="en-US" dirty="0" smtClean="0"/>
                         <a:t>for 15 quants:</a:t>
                       </a:r>
-                      <a:endParaRPr lang="en-US" dirty="0" smtClean="0"/>
                     </a:p>
                   </a:txBody>
                   <a:tcPr/>
@@ -3941,13 +3944,37 @@
           <a:p>
             <a:r>
               <a:rPr lang="en-US" dirty="0" smtClean="0"/>
-              <a:t>the covariance between Y and X is 1, when we quantizes Y with big bins, we do the same operation like enlarging the covariance between them</a:t>
-            </a:r>
-          </a:p>
-          <a:p>
+              <a:t>the </a:t>
+            </a:r>
             <a:r>
               <a:rPr lang="en-US" dirty="0" smtClean="0"/>
-              <a:t>when the covariance between Y and X is bigger than what should be by the relevant modulo size, we will start to get ‘wrong’ distance between X and Y. we need bigger modulo size to cover those errors</a:t>
+              <a:t>conditional variance between </a:t>
+            </a:r>
+            <a:r>
+              <a:rPr lang="en-US" dirty="0" smtClean="0"/>
+              <a:t>Y and X is 1, when we quantizes Y with big bins, we do the same operation like enlarging the </a:t>
+            </a:r>
+            <a:r>
+              <a:rPr lang="en-US" dirty="0"/>
+              <a:t>conditional variance between </a:t>
+            </a:r>
+            <a:r>
+              <a:rPr lang="en-US" dirty="0" smtClean="0"/>
+              <a:t>them</a:t>
+            </a:r>
+          </a:p>
+          <a:p>
+            <a:r>
+              <a:rPr lang="en-US" dirty="0" smtClean="0"/>
+              <a:t>when the </a:t>
+            </a:r>
+            <a:r>
+              <a:rPr lang="en-US" dirty="0"/>
+              <a:t>conditional variance between </a:t>
+            </a:r>
+            <a:r>
+              <a:rPr lang="en-US" dirty="0" smtClean="0"/>
+              <a:t>Y and X is bigger than what should be by the relevant modulo size, we will start to get ‘wrong’ distance between X and Y. we need bigger modulo size to cover those errors</a:t>
             </a:r>
           </a:p>
           <a:p>

</xml_diff>